<commit_message>
[add] traavail du jour
</commit_message>
<xml_diff>
--- a/Templates/morgan.pptx
+++ b/Templates/morgan.pptx
@@ -873,7 +873,7 @@
           <a:p>
             <a:fld id="{515CCE07-1711-4DC7-A7D8-7ED312C82FB8}" type="datetimeFigureOut">
               <a:rPr lang="fr-FR" smtClean="0"/>
-              <a:t>07/06/2022</a:t>
+              <a:t>13/06/2022</a:t>
             </a:fld>
             <a:endParaRPr lang="fr-FR"/>
           </a:p>
@@ -4146,7 +4146,19 @@
             </a:r>
             <a:r>
               <a:rPr lang="fr-FR" sz="800" dirty="0"/>
-              <a:t>, &lt;SJR1&gt; clôture à un &lt;SJR3&gt; strictement inférieur à &lt;ABAC2&gt;. Le mécanisme de remboursement anticipé automatique n’est donc pas activé et le produit ne verse aucun coupon&lt;Mémoire4&gt;.</a:t>
+              <a:t>, &lt;SJR1&gt; clôture à un &lt;SJR3&gt; strictement inférieur à </a:t>
+            </a:r>
+            <a:r>
+              <a:rPr lang="fr-FR" sz="800" dirty="0">
+                <a:highlight>
+                  <a:srgbClr val="FF00FF"/>
+                </a:highlight>
+              </a:rPr>
+              <a:t>&lt;ABAC2&gt;. </a:t>
+            </a:r>
+            <a:r>
+              <a:rPr lang="fr-FR" sz="800" dirty="0"/>
+              <a:t>Le mécanisme de remboursement anticipé automatique n’est donc pas activé et le produit ne verse aucun coupon&lt;Mémoire4&gt;.</a:t>
             </a:r>
           </a:p>
           <a:p>
@@ -6707,7 +6719,7 @@
         <p:spPr>
           <a:xfrm>
             <a:off x="5417820" y="9174546"/>
-            <a:ext cx="1913222" cy="215444"/>
+            <a:ext cx="1913222" cy="338554"/>
           </a:xfrm>
           <a:prstGeom prst="rect">
             <a:avLst/>
@@ -6721,7 +6733,7 @@
           <a:lstStyle/>
           <a:p>
             <a:r>
-              <a:rPr lang="fr-FR" sz="800" u="sng">
+              <a:rPr lang="fr-FR" sz="800" u="sng" dirty="0">
                 <a:highlight>
                   <a:srgbClr val="FF00FF"/>
                 </a:highlight>
@@ -6729,7 +6741,7 @@
               <a:t>Source :</a:t>
             </a:r>
             <a:r>
-              <a:rPr lang="fr-FR" sz="800">
+              <a:rPr lang="fr-FR" sz="800" dirty="0">
                 <a:highlight>
                   <a:srgbClr val="FF00FF"/>
                 </a:highlight>
@@ -6737,7 +6749,7 @@
               <a:t> Bloomberg, le </a:t>
             </a:r>
             <a:r>
-              <a:rPr lang="fr-FR" sz="800">
+              <a:rPr lang="fr-FR" sz="800" dirty="0">
                 <a:solidFill>
                   <a:schemeClr val="tx2"/>
                 </a:solidFill>
@@ -6745,9 +6757,9 @@
                   <a:srgbClr val="FF00FF"/>
                 </a:highlight>
               </a:rPr>
-              <a:t>&lt;DDR1_MAJ&gt;</a:t>
-            </a:r>
-            <a:endParaRPr lang="fr-FR" sz="800">
+              <a:t>&lt;DDR1_MAJ_MIN&gt;</a:t>
+            </a:r>
+            <a:endParaRPr lang="fr-FR" sz="800" dirty="0">
               <a:highlight>
                 <a:srgbClr val="FF00FF"/>
               </a:highlight>
@@ -6784,7 +6796,7 @@
           <a:lstStyle/>
           <a:p>
             <a:r>
-              <a:rPr lang="fr-FR" sz="800" u="sng">
+              <a:rPr lang="fr-FR" sz="800" u="sng" dirty="0">
                 <a:highlight>
                   <a:srgbClr val="FF00FF"/>
                 </a:highlight>
@@ -6792,7 +6804,7 @@
               <a:t>Source :</a:t>
             </a:r>
             <a:r>
-              <a:rPr lang="fr-FR" sz="800">
+              <a:rPr lang="fr-FR" sz="800" dirty="0">
                 <a:highlight>
                   <a:srgbClr val="FF00FF"/>
                 </a:highlight>
@@ -6800,7 +6812,7 @@
               <a:t> Bloomberg, le </a:t>
             </a:r>
             <a:r>
-              <a:rPr lang="fr-FR" sz="800">
+              <a:rPr lang="fr-FR" sz="800" dirty="0">
                 <a:solidFill>
                   <a:schemeClr val="tx2"/>
                 </a:solidFill>
@@ -6810,7 +6822,7 @@
               </a:rPr>
               <a:t>&lt;DDR1_MAJ&gt;</a:t>
             </a:r>
-            <a:endParaRPr lang="fr-FR" sz="800">
+            <a:endParaRPr lang="fr-FR" sz="800" dirty="0">
               <a:highlight>
                 <a:srgbClr val="FF00FF"/>
               </a:highlight>
@@ -7029,7 +7041,7 @@
           <p:nvPr>
             <p:extLst>
               <p:ext uri="{D42A27DB-BD31-4B8C-83A1-F6EECF244321}">
-                <p14:modId xmlns:p14="http://schemas.microsoft.com/office/powerpoint/2010/main" val="4023412434"/>
+                <p14:modId xmlns:p14="http://schemas.microsoft.com/office/powerpoint/2010/main" val="754839707"/>
               </p:ext>
             </p:extLst>
           </p:nvPr>
@@ -11793,14 +11805,17 @@
                         <a:buNone/>
                         <a:tabLst/>
                       </a:pPr>
-                      <a:endParaRPr lang="fr-FR" sz="700" b="0" i="0" kern="1200" dirty="0">
-                        <a:solidFill>
-                          <a:schemeClr val="tx1"/>
-                        </a:solidFill>
-                        <a:latin typeface="+mn-lt"/>
-                        <a:ea typeface="+mn-ea"/>
-                        <a:cs typeface="+mn-cs"/>
-                      </a:endParaRPr>
+                      <a:r>
+                        <a:rPr lang="fr-FR" sz="700" b="0" i="0" kern="1200" dirty="0">
+                          <a:solidFill>
+                            <a:schemeClr val="tx1"/>
+                          </a:solidFill>
+                          <a:latin typeface="+mn-lt"/>
+                          <a:ea typeface="+mn-ea"/>
+                          <a:cs typeface="+mn-cs"/>
+                        </a:rPr>
+                        <a:t>&lt;OUI SI APE/ NON SINON&gt;</a:t>
+                      </a:r>
                     </a:p>
                   </a:txBody>
                   <a:tcPr marT="46800" marB="46800" anchor="ctr" horzOverflow="overflow">
@@ -13867,7 +13882,7 @@
           <p:nvPr>
             <p:extLst>
               <p:ext uri="{D42A27DB-BD31-4B8C-83A1-F6EECF244321}">
-                <p14:modId xmlns:p14="http://schemas.microsoft.com/office/powerpoint/2010/main" val="1307485564"/>
+                <p14:modId xmlns:p14="http://schemas.microsoft.com/office/powerpoint/2010/main" val="3268415409"/>
               </p:ext>
             </p:extLst>
           </p:nvPr>
@@ -18769,14 +18784,17 @@
                         <a:buNone/>
                         <a:tabLst/>
                       </a:pPr>
-                      <a:endParaRPr lang="fr-FR" sz="700" b="0" i="0" kern="1200" dirty="0">
-                        <a:solidFill>
-                          <a:schemeClr val="tx1"/>
-                        </a:solidFill>
-                        <a:latin typeface="+mn-lt"/>
-                        <a:ea typeface="+mn-ea"/>
-                        <a:cs typeface="+mn-cs"/>
-                      </a:endParaRPr>
+                      <a:r>
+                        <a:rPr lang="fr-FR" sz="700" b="0" i="0" kern="1200" dirty="0">
+                          <a:solidFill>
+                            <a:schemeClr val="tx1"/>
+                          </a:solidFill>
+                          <a:latin typeface="+mn-lt"/>
+                          <a:ea typeface="+mn-ea"/>
+                          <a:cs typeface="+mn-cs"/>
+                        </a:rPr>
+                        <a:t>&lt;OUI SI APE/ NON SINON&gt;</a:t>
+                      </a:r>
                     </a:p>
                   </a:txBody>
                   <a:tcPr marT="46800" marB="46800" anchor="ctr" horzOverflow="overflow">
@@ -27036,7 +27054,19 @@
           <a:p>
             <a:r>
               <a:rPr lang="fr-FR" sz="800" dirty="0"/>
-              <a:t>&lt;balisedeg2&gt; &lt;balisedeg3&gt;</a:t>
+              <a:t>&lt;balisedeg2&gt; </a:t>
+            </a:r>
+            <a:r>
+              <a:rPr lang="fr-FR" sz="800" dirty="0">
+                <a:highlight>
+                  <a:srgbClr val="FF00FF"/>
+                </a:highlight>
+              </a:rPr>
+              <a:t>&lt;balisedeg3</a:t>
+            </a:r>
+            <a:r>
+              <a:rPr lang="fr-FR" sz="800" dirty="0"/>
+              <a:t>&gt;</a:t>
             </a:r>
             <a:endParaRPr lang="en-US" sz="800" dirty="0"/>
           </a:p>
@@ -31829,7 +31859,26 @@
                   <a:srgbClr val="000000"/>
                 </a:solidFill>
               </a:rPr>
-              <a:t>et l’investisseur récupère alors l’intégralité de son capital initial, majorée d’un  &lt;CG&gt; de &lt;CPN&gt; par &lt;F0&gt; &lt;F2&gt; depuis le &lt;DDCI&gt; (soit &lt;GCA&gt;</a:t>
+              <a:t>et l’investisseur récupère alors l’intégralité de son capital initial, majorée d’un &lt;</a:t>
+            </a:r>
+            <a:r>
+              <a:rPr lang="fr-FR" sz="800" dirty="0">
+                <a:solidFill>
+                  <a:srgbClr val="000000"/>
+                </a:solidFill>
+                <a:highlight>
+                  <a:srgbClr val="FF00FF"/>
+                </a:highlight>
+              </a:rPr>
+              <a:t>GC</a:t>
+            </a:r>
+            <a:r>
+              <a:rPr lang="fr-FR" sz="800" dirty="0">
+                <a:solidFill>
+                  <a:srgbClr val="000000"/>
+                </a:solidFill>
+              </a:rPr>
+              <a:t>&gt; de &lt;CPN&gt; par &lt;F0&gt; &lt;F2&gt; depuis le &lt;DDCI&gt; (soit &lt;GCA&gt;</a:t>
             </a:r>
             <a:r>
               <a:rPr lang="fr-FR" sz="800" i="1" dirty="0">

</xml_diff>